<commit_message>
added and update new files
</commit_message>
<xml_diff>
--- a/documents/SystemFlow.pptx
+++ b/documents/SystemFlow.pptx
@@ -4936,7 +4936,19 @@
             </a:pPr>
             <a:r>
               <a:rPr lang="en-SG" sz="1400" dirty="0" smtClean="0"/>
-              <a:t>GPIO adaptor extract info and output to LED, Servo or </a:t>
+              <a:t>GPIO </a:t>
+            </a:r>
+            <a:r>
+              <a:rPr lang="en-SG" sz="1400" smtClean="0"/>
+              <a:t>plugin module</a:t>
+            </a:r>
+            <a:r>
+              <a:rPr lang="en-SG" sz="1400" smtClean="0"/>
+              <a:t> </a:t>
+            </a:r>
+            <a:r>
+              <a:rPr lang="en-SG" sz="1400" dirty="0" smtClean="0"/>
+              <a:t>extract info and output to LED, Servo or </a:t>
             </a:r>
             <a:r>
               <a:rPr lang="en-SG" sz="1400" dirty="0" err="1" smtClean="0"/>

</xml_diff>